<commit_message>
Adding different pages of app to ppt
</commit_message>
<xml_diff>
--- a/CPAD Assignment 1.pptx
+++ b/CPAD Assignment 1.pptx
@@ -8,8 +8,9 @@
     <p:sldId id="256" r:id="rId2"/>
     <p:sldId id="257" r:id="rId3"/>
     <p:sldId id="258" r:id="rId4"/>
-    <p:sldId id="259" r:id="rId5"/>
-    <p:sldId id="260" r:id="rId6"/>
+    <p:sldId id="261" r:id="rId5"/>
+    <p:sldId id="259" r:id="rId6"/>
+    <p:sldId id="260" r:id="rId7"/>
   </p:sldIdLst>
   <p:sldSz cx="12192000" cy="6858000"/>
   <p:notesSz cx="6858000" cy="9144000"/>
@@ -108,6 +109,11 @@
       </a:defRPr>
     </a:lvl9pPr>
   </p:defaultTextStyle>
+  <p:extLst>
+    <p:ext uri="{EFAFB233-063F-42B5-8137-9DF3F51BA10A}">
+      <p15:sldGuideLst xmlns:p15="http://schemas.microsoft.com/office/powerpoint/2012/main"/>
+    </p:ext>
+  </p:extLst>
 </p:presentation>
 </file>
 
@@ -299,7 +305,7 @@
           <a:p>
             <a:fld id="{7755C7C1-2F79-453D-ADA3-54F65ED9C8B9}" type="datetimeFigureOut">
               <a:rPr lang="en-IN" smtClean="0"/>
-              <a:t>20-10-2021</a:t>
+              <a:t>02-11-2021</a:t>
             </a:fld>
             <a:endParaRPr lang="en-IN"/>
           </a:p>
@@ -637,7 +643,7 @@
           <a:p>
             <a:fld id="{7755C7C1-2F79-453D-ADA3-54F65ED9C8B9}" type="datetimeFigureOut">
               <a:rPr lang="en-IN" smtClean="0"/>
-              <a:t>20-10-2021</a:t>
+              <a:t>02-11-2021</a:t>
             </a:fld>
             <a:endParaRPr lang="en-IN"/>
           </a:p>
@@ -1038,7 +1044,7 @@
           <a:p>
             <a:fld id="{7755C7C1-2F79-453D-ADA3-54F65ED9C8B9}" type="datetimeFigureOut">
               <a:rPr lang="en-IN" smtClean="0"/>
-              <a:t>20-10-2021</a:t>
+              <a:t>02-11-2021</a:t>
             </a:fld>
             <a:endParaRPr lang="en-IN"/>
           </a:p>
@@ -1374,7 +1380,7 @@
           <a:p>
             <a:fld id="{7755C7C1-2F79-453D-ADA3-54F65ED9C8B9}" type="datetimeFigureOut">
               <a:rPr lang="en-IN" smtClean="0"/>
-              <a:t>20-10-2021</a:t>
+              <a:t>02-11-2021</a:t>
             </a:fld>
             <a:endParaRPr lang="en-IN"/>
           </a:p>
@@ -1694,7 +1700,7 @@
           <a:p>
             <a:fld id="{7755C7C1-2F79-453D-ADA3-54F65ED9C8B9}" type="datetimeFigureOut">
               <a:rPr lang="en-IN" smtClean="0"/>
-              <a:t>20-10-2021</a:t>
+              <a:t>02-11-2021</a:t>
             </a:fld>
             <a:endParaRPr lang="en-IN"/>
           </a:p>
@@ -2090,7 +2096,7 @@
           <a:p>
             <a:fld id="{7755C7C1-2F79-453D-ADA3-54F65ED9C8B9}" type="datetimeFigureOut">
               <a:rPr lang="en-IN" smtClean="0"/>
-              <a:t>20-10-2021</a:t>
+              <a:t>02-11-2021</a:t>
             </a:fld>
             <a:endParaRPr lang="en-IN"/>
           </a:p>
@@ -2347,7 +2353,7 @@
           <a:p>
             <a:fld id="{7755C7C1-2F79-453D-ADA3-54F65ED9C8B9}" type="datetimeFigureOut">
               <a:rPr lang="en-IN" smtClean="0"/>
-              <a:t>20-10-2021</a:t>
+              <a:t>02-11-2021</a:t>
             </a:fld>
             <a:endParaRPr lang="en-IN"/>
           </a:p>
@@ -2609,7 +2615,7 @@
           <a:p>
             <a:fld id="{7755C7C1-2F79-453D-ADA3-54F65ED9C8B9}" type="datetimeFigureOut">
               <a:rPr lang="en-IN" smtClean="0"/>
-              <a:t>20-10-2021</a:t>
+              <a:t>02-11-2021</a:t>
             </a:fld>
             <a:endParaRPr lang="en-IN"/>
           </a:p>
@@ -2871,7 +2877,7 @@
           <a:p>
             <a:fld id="{7755C7C1-2F79-453D-ADA3-54F65ED9C8B9}" type="datetimeFigureOut">
               <a:rPr lang="en-IN" smtClean="0"/>
-              <a:t>20-10-2021</a:t>
+              <a:t>02-11-2021</a:t>
             </a:fld>
             <a:endParaRPr lang="en-IN"/>
           </a:p>
@@ -3200,7 +3206,7 @@
           <a:p>
             <a:fld id="{7755C7C1-2F79-453D-ADA3-54F65ED9C8B9}" type="datetimeFigureOut">
               <a:rPr lang="en-IN" smtClean="0"/>
-              <a:t>20-10-2021</a:t>
+              <a:t>02-11-2021</a:t>
             </a:fld>
             <a:endParaRPr lang="en-IN"/>
           </a:p>
@@ -3523,7 +3529,7 @@
           <a:p>
             <a:fld id="{7755C7C1-2F79-453D-ADA3-54F65ED9C8B9}" type="datetimeFigureOut">
               <a:rPr lang="en-IN" smtClean="0"/>
-              <a:t>20-10-2021</a:t>
+              <a:t>02-11-2021</a:t>
             </a:fld>
             <a:endParaRPr lang="en-IN"/>
           </a:p>
@@ -3980,7 +3986,7 @@
           <a:p>
             <a:fld id="{7755C7C1-2F79-453D-ADA3-54F65ED9C8B9}" type="datetimeFigureOut">
               <a:rPr lang="en-IN" smtClean="0"/>
-              <a:t>20-10-2021</a:t>
+              <a:t>02-11-2021</a:t>
             </a:fld>
             <a:endParaRPr lang="en-IN"/>
           </a:p>
@@ -4185,7 +4191,7 @@
           <a:p>
             <a:fld id="{7755C7C1-2F79-453D-ADA3-54F65ED9C8B9}" type="datetimeFigureOut">
               <a:rPr lang="en-IN" smtClean="0"/>
-              <a:t>20-10-2021</a:t>
+              <a:t>02-11-2021</a:t>
             </a:fld>
             <a:endParaRPr lang="en-IN"/>
           </a:p>
@@ -4362,7 +4368,7 @@
           <a:p>
             <a:fld id="{7755C7C1-2F79-453D-ADA3-54F65ED9C8B9}" type="datetimeFigureOut">
               <a:rPr lang="en-IN" smtClean="0"/>
-              <a:t>20-10-2021</a:t>
+              <a:t>02-11-2021</a:t>
             </a:fld>
             <a:endParaRPr lang="en-IN"/>
           </a:p>
@@ -4695,7 +4701,7 @@
           <a:p>
             <a:fld id="{7755C7C1-2F79-453D-ADA3-54F65ED9C8B9}" type="datetimeFigureOut">
               <a:rPr lang="en-IN" smtClean="0"/>
-              <a:t>20-10-2021</a:t>
+              <a:t>02-11-2021</a:t>
             </a:fld>
             <a:endParaRPr lang="en-IN"/>
           </a:p>
@@ -5040,7 +5046,7 @@
           <a:p>
             <a:fld id="{7755C7C1-2F79-453D-ADA3-54F65ED9C8B9}" type="datetimeFigureOut">
               <a:rPr lang="en-IN" smtClean="0"/>
-              <a:t>20-10-2021</a:t>
+              <a:t>02-11-2021</a:t>
             </a:fld>
             <a:endParaRPr lang="en-IN"/>
           </a:p>
@@ -7157,7 +7163,7 @@
           <a:p>
             <a:fld id="{7755C7C1-2F79-453D-ADA3-54F65ED9C8B9}" type="datetimeFigureOut">
               <a:rPr lang="en-IN" smtClean="0"/>
-              <a:t>20-10-2021</a:t>
+              <a:t>02-11-2021</a:t>
             </a:fld>
             <a:endParaRPr lang="en-IN"/>
           </a:p>
@@ -8157,6 +8163,126 @@
           <p:cNvPr id="2" name="Title 1">
             <a:extLst>
               <a:ext uri="{FF2B5EF4-FFF2-40B4-BE49-F238E27FC236}">
+                <a16:creationId xmlns:a16="http://schemas.microsoft.com/office/drawing/2014/main" id="{D0E8ECDC-AAF2-4084-AF89-0CE3773F88CA}"/>
+              </a:ext>
+            </a:extLst>
+          </p:cNvPr>
+          <p:cNvSpPr>
+            <a:spLocks noGrp="1"/>
+          </p:cNvSpPr>
+          <p:nvPr>
+            <p:ph type="title"/>
+          </p:nvPr>
+        </p:nvSpPr>
+        <p:spPr/>
+        <p:txBody>
+          <a:bodyPr/>
+          <a:lstStyle/>
+          <a:p>
+            <a:r>
+              <a:rPr lang="en-US" dirty="0"/>
+              <a:t>Different screens / pages</a:t>
+            </a:r>
+            <a:endParaRPr lang="en-IN" dirty="0"/>
+          </a:p>
+        </p:txBody>
+      </p:sp>
+      <p:sp>
+        <p:nvSpPr>
+          <p:cNvPr id="3" name="Content Placeholder 2">
+            <a:extLst>
+              <a:ext uri="{FF2B5EF4-FFF2-40B4-BE49-F238E27FC236}">
+                <a16:creationId xmlns:a16="http://schemas.microsoft.com/office/drawing/2014/main" id="{1D2E71EC-7F3D-492F-94E0-2E5027933CDF}"/>
+              </a:ext>
+            </a:extLst>
+          </p:cNvPr>
+          <p:cNvSpPr>
+            <a:spLocks noGrp="1"/>
+          </p:cNvSpPr>
+          <p:nvPr>
+            <p:ph idx="1"/>
+          </p:nvPr>
+        </p:nvSpPr>
+        <p:spPr/>
+        <p:txBody>
+          <a:bodyPr/>
+          <a:lstStyle/>
+          <a:p>
+            <a:r>
+              <a:rPr lang="en-US" dirty="0"/>
+              <a:t>Login / Signup page</a:t>
+            </a:r>
+          </a:p>
+          <a:p>
+            <a:r>
+              <a:rPr lang="en-US" dirty="0"/>
+              <a:t>Buyer screen</a:t>
+            </a:r>
+          </a:p>
+          <a:p>
+            <a:r>
+              <a:rPr lang="en-US" dirty="0"/>
+              <a:t>Seller Screen</a:t>
+            </a:r>
+          </a:p>
+          <a:p>
+            <a:r>
+              <a:rPr lang="en-US" dirty="0"/>
+              <a:t>Cart page</a:t>
+            </a:r>
+          </a:p>
+          <a:p>
+            <a:r>
+              <a:rPr lang="en-US" dirty="0"/>
+              <a:t>Checkout screen</a:t>
+            </a:r>
+          </a:p>
+          <a:p>
+            <a:pPr marL="0" indent="0">
+              <a:buNone/>
+            </a:pPr>
+            <a:endParaRPr lang="en-US" dirty="0"/>
+          </a:p>
+          <a:p>
+            <a:endParaRPr lang="en-IN" dirty="0"/>
+          </a:p>
+        </p:txBody>
+      </p:sp>
+    </p:spTree>
+    <p:extLst>
+      <p:ext uri="{BB962C8B-B14F-4D97-AF65-F5344CB8AC3E}">
+        <p14:creationId xmlns:p14="http://schemas.microsoft.com/office/powerpoint/2010/main" val="129646622"/>
+      </p:ext>
+    </p:extLst>
+  </p:cSld>
+  <p:clrMapOvr>
+    <a:masterClrMapping/>
+  </p:clrMapOvr>
+</p:sld>
+</file>
+
+<file path=ppt/slides/slide5.xml><?xml version="1.0" encoding="utf-8"?>
+<p:sld xmlns:a="http://schemas.openxmlformats.org/drawingml/2006/main" xmlns:r="http://schemas.openxmlformats.org/officeDocument/2006/relationships" xmlns:p="http://schemas.openxmlformats.org/presentationml/2006/main">
+  <p:cSld>
+    <p:spTree>
+      <p:nvGrpSpPr>
+        <p:cNvPr id="1" name=""/>
+        <p:cNvGrpSpPr/>
+        <p:nvPr/>
+      </p:nvGrpSpPr>
+      <p:grpSpPr>
+        <a:xfrm>
+          <a:off x="0" y="0"/>
+          <a:ext cx="0" cy="0"/>
+          <a:chOff x="0" y="0"/>
+          <a:chExt cx="0" cy="0"/>
+        </a:xfrm>
+      </p:grpSpPr>
+      <p:sp>
+        <p:nvSpPr>
+          <p:cNvPr id="2" name="Title 1">
+            <a:extLst>
+              <a:ext uri="{FF2B5EF4-FFF2-40B4-BE49-F238E27FC236}">
                 <a16:creationId xmlns:a16="http://schemas.microsoft.com/office/drawing/2014/main" id="{707DDEF0-9090-41A0-B68D-4181173F8AA6}"/>
               </a:ext>
             </a:extLst>
@@ -8268,7 +8394,7 @@
 </p:sld>
 </file>
 
-<file path=ppt/slides/slide5.xml><?xml version="1.0" encoding="utf-8"?>
+<file path=ppt/slides/slide6.xml><?xml version="1.0" encoding="utf-8"?>
 <p:sld xmlns:a="http://schemas.openxmlformats.org/drawingml/2006/main" xmlns:r="http://schemas.openxmlformats.org/officeDocument/2006/relationships" xmlns:p="http://schemas.openxmlformats.org/presentationml/2006/main">
   <p:cSld>
     <p:spTree>

</xml_diff>

<commit_message>
Adding Checkout and review cart screen
</commit_message>
<xml_diff>
--- a/CPAD Assignment 1.pptx
+++ b/CPAD Assignment 1.pptx
@@ -305,7 +305,7 @@
           <a:p>
             <a:fld id="{7755C7C1-2F79-453D-ADA3-54F65ED9C8B9}" type="datetimeFigureOut">
               <a:rPr lang="en-IN" smtClean="0"/>
-              <a:t>02-11-2021</a:t>
+              <a:t>17-12-21</a:t>
             </a:fld>
             <a:endParaRPr lang="en-IN"/>
           </a:p>
@@ -643,7 +643,7 @@
           <a:p>
             <a:fld id="{7755C7C1-2F79-453D-ADA3-54F65ED9C8B9}" type="datetimeFigureOut">
               <a:rPr lang="en-IN" smtClean="0"/>
-              <a:t>02-11-2021</a:t>
+              <a:t>17-12-21</a:t>
             </a:fld>
             <a:endParaRPr lang="en-IN"/>
           </a:p>
@@ -1044,7 +1044,7 @@
           <a:p>
             <a:fld id="{7755C7C1-2F79-453D-ADA3-54F65ED9C8B9}" type="datetimeFigureOut">
               <a:rPr lang="en-IN" smtClean="0"/>
-              <a:t>02-11-2021</a:t>
+              <a:t>17-12-21</a:t>
             </a:fld>
             <a:endParaRPr lang="en-IN"/>
           </a:p>
@@ -1380,7 +1380,7 @@
           <a:p>
             <a:fld id="{7755C7C1-2F79-453D-ADA3-54F65ED9C8B9}" type="datetimeFigureOut">
               <a:rPr lang="en-IN" smtClean="0"/>
-              <a:t>02-11-2021</a:t>
+              <a:t>17-12-21</a:t>
             </a:fld>
             <a:endParaRPr lang="en-IN"/>
           </a:p>
@@ -1700,7 +1700,7 @@
           <a:p>
             <a:fld id="{7755C7C1-2F79-453D-ADA3-54F65ED9C8B9}" type="datetimeFigureOut">
               <a:rPr lang="en-IN" smtClean="0"/>
-              <a:t>02-11-2021</a:t>
+              <a:t>17-12-21</a:t>
             </a:fld>
             <a:endParaRPr lang="en-IN"/>
           </a:p>
@@ -2096,7 +2096,7 @@
           <a:p>
             <a:fld id="{7755C7C1-2F79-453D-ADA3-54F65ED9C8B9}" type="datetimeFigureOut">
               <a:rPr lang="en-IN" smtClean="0"/>
-              <a:t>02-11-2021</a:t>
+              <a:t>17-12-21</a:t>
             </a:fld>
             <a:endParaRPr lang="en-IN"/>
           </a:p>
@@ -2353,7 +2353,7 @@
           <a:p>
             <a:fld id="{7755C7C1-2F79-453D-ADA3-54F65ED9C8B9}" type="datetimeFigureOut">
               <a:rPr lang="en-IN" smtClean="0"/>
-              <a:t>02-11-2021</a:t>
+              <a:t>17-12-21</a:t>
             </a:fld>
             <a:endParaRPr lang="en-IN"/>
           </a:p>
@@ -2615,7 +2615,7 @@
           <a:p>
             <a:fld id="{7755C7C1-2F79-453D-ADA3-54F65ED9C8B9}" type="datetimeFigureOut">
               <a:rPr lang="en-IN" smtClean="0"/>
-              <a:t>02-11-2021</a:t>
+              <a:t>17-12-21</a:t>
             </a:fld>
             <a:endParaRPr lang="en-IN"/>
           </a:p>
@@ -2877,7 +2877,7 @@
           <a:p>
             <a:fld id="{7755C7C1-2F79-453D-ADA3-54F65ED9C8B9}" type="datetimeFigureOut">
               <a:rPr lang="en-IN" smtClean="0"/>
-              <a:t>02-11-2021</a:t>
+              <a:t>17-12-21</a:t>
             </a:fld>
             <a:endParaRPr lang="en-IN"/>
           </a:p>
@@ -3206,7 +3206,7 @@
           <a:p>
             <a:fld id="{7755C7C1-2F79-453D-ADA3-54F65ED9C8B9}" type="datetimeFigureOut">
               <a:rPr lang="en-IN" smtClean="0"/>
-              <a:t>02-11-2021</a:t>
+              <a:t>17-12-21</a:t>
             </a:fld>
             <a:endParaRPr lang="en-IN"/>
           </a:p>
@@ -3529,7 +3529,7 @@
           <a:p>
             <a:fld id="{7755C7C1-2F79-453D-ADA3-54F65ED9C8B9}" type="datetimeFigureOut">
               <a:rPr lang="en-IN" smtClean="0"/>
-              <a:t>02-11-2021</a:t>
+              <a:t>17-12-21</a:t>
             </a:fld>
             <a:endParaRPr lang="en-IN"/>
           </a:p>
@@ -3986,7 +3986,7 @@
           <a:p>
             <a:fld id="{7755C7C1-2F79-453D-ADA3-54F65ED9C8B9}" type="datetimeFigureOut">
               <a:rPr lang="en-IN" smtClean="0"/>
-              <a:t>02-11-2021</a:t>
+              <a:t>17-12-21</a:t>
             </a:fld>
             <a:endParaRPr lang="en-IN"/>
           </a:p>
@@ -4191,7 +4191,7 @@
           <a:p>
             <a:fld id="{7755C7C1-2F79-453D-ADA3-54F65ED9C8B9}" type="datetimeFigureOut">
               <a:rPr lang="en-IN" smtClean="0"/>
-              <a:t>02-11-2021</a:t>
+              <a:t>17-12-21</a:t>
             </a:fld>
             <a:endParaRPr lang="en-IN"/>
           </a:p>
@@ -4368,7 +4368,7 @@
           <a:p>
             <a:fld id="{7755C7C1-2F79-453D-ADA3-54F65ED9C8B9}" type="datetimeFigureOut">
               <a:rPr lang="en-IN" smtClean="0"/>
-              <a:t>02-11-2021</a:t>
+              <a:t>17-12-21</a:t>
             </a:fld>
             <a:endParaRPr lang="en-IN"/>
           </a:p>
@@ -4701,7 +4701,7 @@
           <a:p>
             <a:fld id="{7755C7C1-2F79-453D-ADA3-54F65ED9C8B9}" type="datetimeFigureOut">
               <a:rPr lang="en-IN" smtClean="0"/>
-              <a:t>02-11-2021</a:t>
+              <a:t>17-12-21</a:t>
             </a:fld>
             <a:endParaRPr lang="en-IN"/>
           </a:p>
@@ -5046,7 +5046,7 @@
           <a:p>
             <a:fld id="{7755C7C1-2F79-453D-ADA3-54F65ED9C8B9}" type="datetimeFigureOut">
               <a:rPr lang="en-IN" smtClean="0"/>
-              <a:t>02-11-2021</a:t>
+              <a:t>17-12-21</a:t>
             </a:fld>
             <a:endParaRPr lang="en-IN"/>
           </a:p>
@@ -7163,7 +7163,7 @@
           <a:p>
             <a:fld id="{7755C7C1-2F79-453D-ADA3-54F65ED9C8B9}" type="datetimeFigureOut">
               <a:rPr lang="en-IN" smtClean="0"/>
-              <a:t>02-11-2021</a:t>
+              <a:t>17-12-21</a:t>
             </a:fld>
             <a:endParaRPr lang="en-IN"/>
           </a:p>
@@ -7893,7 +7893,7 @@
             <a:pPr lvl="1"/>
             <a:r>
               <a:rPr lang="en-US" dirty="0"/>
-              <a:t>Web</a:t>
+              <a:t>iOS</a:t>
             </a:r>
           </a:p>
           <a:p>
@@ -8091,21 +8091,7 @@
           <a:p>
             <a:r>
               <a:rPr lang="en-US" dirty="0"/>
-              <a:t>Social Logins ( through Google acc, FB </a:t>
-            </a:r>
-            <a:r>
-              <a:rPr lang="en-US" dirty="0" err="1"/>
-              <a:t>etc</a:t>
-            </a:r>
-            <a:r>
-              <a:rPr lang="en-US" dirty="0"/>
-              <a:t> )</a:t>
-            </a:r>
-          </a:p>
-          <a:p>
-            <a:r>
-              <a:rPr lang="en-US" dirty="0"/>
-              <a:t>Login and logout through new account</a:t>
+              <a:t>Social Logins ( through Google acc. )</a:t>
             </a:r>
           </a:p>
           <a:p>
@@ -8216,19 +8202,31 @@
           <a:p>
             <a:r>
               <a:rPr lang="en-US" dirty="0"/>
-              <a:t>Buyer screen</a:t>
+              <a:t>My Profile Screen</a:t>
             </a:r>
           </a:p>
           <a:p>
             <a:r>
               <a:rPr lang="en-US" dirty="0"/>
-              <a:t>Seller Screen</a:t>
+              <a:t>Home screen</a:t>
             </a:r>
           </a:p>
           <a:p>
             <a:r>
               <a:rPr lang="en-US" dirty="0"/>
-              <a:t>Cart page</a:t>
+              <a:t>Product screen</a:t>
+            </a:r>
+          </a:p>
+          <a:p>
+            <a:r>
+              <a:rPr lang="en-US" dirty="0"/>
+              <a:t>Search Screen</a:t>
+            </a:r>
+          </a:p>
+          <a:p>
+            <a:r>
+              <a:rPr lang="en-US" dirty="0"/>
+              <a:t>Review Cart page</a:t>
             </a:r>
           </a:p>
           <a:p>

</xml_diff>